<commit_message>
(design) Update revision tree graphic for wiki to include V3.2.
</commit_message>
<xml_diff>
--- a/GridLAB-D_Family_Tree.pptx
+++ b/GridLAB-D_Family_Tree.pptx
@@ -288,7 +288,7 @@
           <a:p>
             <a:fld id="{D0F0FE34-5DA5-4D4A-9B61-DF714B9459B6}" type="datetimeFigureOut">
               <a:rPr lang="en-US" smtClean="0"/>
-              <a:t>10/26/13</a:t>
+              <a:t>8/12/2014</a:t>
             </a:fld>
             <a:endParaRPr lang="en-US"/>
           </a:p>
@@ -458,7 +458,7 @@
           <a:p>
             <a:fld id="{D0F0FE34-5DA5-4D4A-9B61-DF714B9459B6}" type="datetimeFigureOut">
               <a:rPr lang="en-US" smtClean="0"/>
-              <a:t>10/26/13</a:t>
+              <a:t>8/12/2014</a:t>
             </a:fld>
             <a:endParaRPr lang="en-US"/>
           </a:p>
@@ -638,7 +638,7 @@
           <a:p>
             <a:fld id="{D0F0FE34-5DA5-4D4A-9B61-DF714B9459B6}" type="datetimeFigureOut">
               <a:rPr lang="en-US" smtClean="0"/>
-              <a:t>10/26/13</a:t>
+              <a:t>8/12/2014</a:t>
             </a:fld>
             <a:endParaRPr lang="en-US"/>
           </a:p>
@@ -808,7 +808,7 @@
           <a:p>
             <a:fld id="{D0F0FE34-5DA5-4D4A-9B61-DF714B9459B6}" type="datetimeFigureOut">
               <a:rPr lang="en-US" smtClean="0"/>
-              <a:t>10/26/13</a:t>
+              <a:t>8/12/2014</a:t>
             </a:fld>
             <a:endParaRPr lang="en-US"/>
           </a:p>
@@ -1054,7 +1054,7 @@
           <a:p>
             <a:fld id="{D0F0FE34-5DA5-4D4A-9B61-DF714B9459B6}" type="datetimeFigureOut">
               <a:rPr lang="en-US" smtClean="0"/>
-              <a:t>10/26/13</a:t>
+              <a:t>8/12/2014</a:t>
             </a:fld>
             <a:endParaRPr lang="en-US"/>
           </a:p>
@@ -1342,7 +1342,7 @@
           <a:p>
             <a:fld id="{D0F0FE34-5DA5-4D4A-9B61-DF714B9459B6}" type="datetimeFigureOut">
               <a:rPr lang="en-US" smtClean="0"/>
-              <a:t>10/26/13</a:t>
+              <a:t>8/12/2014</a:t>
             </a:fld>
             <a:endParaRPr lang="en-US"/>
           </a:p>
@@ -1764,7 +1764,7 @@
           <a:p>
             <a:fld id="{D0F0FE34-5DA5-4D4A-9B61-DF714B9459B6}" type="datetimeFigureOut">
               <a:rPr lang="en-US" smtClean="0"/>
-              <a:t>10/26/13</a:t>
+              <a:t>8/12/2014</a:t>
             </a:fld>
             <a:endParaRPr lang="en-US"/>
           </a:p>
@@ -1882,7 +1882,7 @@
           <a:p>
             <a:fld id="{D0F0FE34-5DA5-4D4A-9B61-DF714B9459B6}" type="datetimeFigureOut">
               <a:rPr lang="en-US" smtClean="0"/>
-              <a:t>10/26/13</a:t>
+              <a:t>8/12/2014</a:t>
             </a:fld>
             <a:endParaRPr lang="en-US"/>
           </a:p>
@@ -1977,7 +1977,7 @@
           <a:p>
             <a:fld id="{D0F0FE34-5DA5-4D4A-9B61-DF714B9459B6}" type="datetimeFigureOut">
               <a:rPr lang="en-US" smtClean="0"/>
-              <a:t>10/26/13</a:t>
+              <a:t>8/12/2014</a:t>
             </a:fld>
             <a:endParaRPr lang="en-US"/>
           </a:p>
@@ -2254,7 +2254,7 @@
           <a:p>
             <a:fld id="{D0F0FE34-5DA5-4D4A-9B61-DF714B9459B6}" type="datetimeFigureOut">
               <a:rPr lang="en-US" smtClean="0"/>
-              <a:t>10/26/13</a:t>
+              <a:t>8/12/2014</a:t>
             </a:fld>
             <a:endParaRPr lang="en-US"/>
           </a:p>
@@ -2507,7 +2507,7 @@
           <a:p>
             <a:fld id="{D0F0FE34-5DA5-4D4A-9B61-DF714B9459B6}" type="datetimeFigureOut">
               <a:rPr lang="en-US" smtClean="0"/>
-              <a:t>10/26/13</a:t>
+              <a:t>8/12/2014</a:t>
             </a:fld>
             <a:endParaRPr lang="en-US"/>
           </a:p>
@@ -2720,7 +2720,7 @@
           <a:p>
             <a:fld id="{D0F0FE34-5DA5-4D4A-9B61-DF714B9459B6}" type="datetimeFigureOut">
               <a:rPr lang="en-US" smtClean="0"/>
-              <a:t>10/26/13</a:t>
+              <a:t>8/12/2014</a:t>
             </a:fld>
             <a:endParaRPr lang="en-US"/>
           </a:p>
@@ -3097,232 +3097,13 @@
       </p:grpSpPr>
       <p:sp>
         <p:nvSpPr>
-          <p:cNvPr id="4" name="Rectangle 3"/>
-          <p:cNvSpPr/>
-          <p:nvPr/>
-        </p:nvSpPr>
-        <p:spPr>
-          <a:xfrm>
-            <a:off x="315952" y="489415"/>
-            <a:ext cx="885902" cy="421268"/>
-          </a:xfrm>
-          <a:prstGeom prst="rect">
-            <a:avLst/>
-          </a:prstGeom>
-        </p:spPr>
-        <p:style>
-          <a:lnRef idx="0">
-            <a:schemeClr val="accent5"/>
-          </a:lnRef>
-          <a:fillRef idx="3">
-            <a:schemeClr val="accent5"/>
-          </a:fillRef>
-          <a:effectRef idx="3">
-            <a:schemeClr val="accent5"/>
-          </a:effectRef>
-          <a:fontRef idx="minor">
-            <a:schemeClr val="lt1"/>
-          </a:fontRef>
-        </p:style>
-        <p:txBody>
-          <a:bodyPr wrap="none" lIns="0" tIns="0" rIns="0" bIns="0" rtlCol="0" anchor="ctr"/>
-          <a:lstStyle/>
-          <a:p>
-            <a:pPr algn="ctr"/>
-            <a:r>
-              <a:rPr lang="en-US" sz="1050" dirty="0" smtClean="0"/>
-              <a:t>2.0 Diablo </a:t>
-            </a:r>
-          </a:p>
-          <a:p>
-            <a:pPr algn="ctr"/>
-            <a:r>
-              <a:rPr lang="en-US" sz="1050" dirty="0" smtClean="0"/>
-              <a:t>9/2009</a:t>
-            </a:r>
-            <a:endParaRPr lang="en-US" sz="1050" dirty="0"/>
-          </a:p>
-        </p:txBody>
-      </p:sp>
-      <p:sp>
-        <p:nvSpPr>
-          <p:cNvPr id="5" name="Rectangle 4"/>
-          <p:cNvSpPr/>
-          <p:nvPr/>
-        </p:nvSpPr>
-        <p:spPr>
-          <a:xfrm>
-            <a:off x="1403815" y="489415"/>
-            <a:ext cx="885902" cy="421268"/>
-          </a:xfrm>
-          <a:prstGeom prst="rect">
-            <a:avLst/>
-          </a:prstGeom>
-        </p:spPr>
-        <p:style>
-          <a:lnRef idx="0">
-            <a:schemeClr val="accent5"/>
-          </a:lnRef>
-          <a:fillRef idx="3">
-            <a:schemeClr val="accent5"/>
-          </a:fillRef>
-          <a:effectRef idx="3">
-            <a:schemeClr val="accent5"/>
-          </a:effectRef>
-          <a:fontRef idx="minor">
-            <a:schemeClr val="lt1"/>
-          </a:fontRef>
-        </p:style>
-        <p:txBody>
-          <a:bodyPr wrap="none" lIns="0" tIns="0" rIns="0" bIns="0" rtlCol="0" anchor="ctr"/>
-          <a:lstStyle/>
-          <a:p>
-            <a:pPr algn="ctr"/>
-            <a:r>
-              <a:rPr lang="en-US" sz="1050" dirty="0" smtClean="0"/>
-              <a:t>2.1 Eldorado</a:t>
-            </a:r>
-          </a:p>
-          <a:p>
-            <a:pPr algn="ctr"/>
-            <a:r>
-              <a:rPr lang="en-US" sz="1050" dirty="0" smtClean="0"/>
-              <a:t>10/2010</a:t>
-            </a:r>
-            <a:endParaRPr lang="en-US" sz="1050" dirty="0"/>
-          </a:p>
-        </p:txBody>
-      </p:sp>
-      <p:cxnSp>
-        <p:nvCxnSpPr>
-          <p:cNvPr id="7" name="Straight Arrow Connector 6"/>
-          <p:cNvCxnSpPr>
-            <a:stCxn id="4" idx="3"/>
-            <a:endCxn id="5" idx="1"/>
-          </p:cNvCxnSpPr>
-          <p:nvPr/>
-        </p:nvCxnSpPr>
-        <p:spPr>
-          <a:xfrm>
-            <a:off x="1201854" y="700049"/>
-            <a:ext cx="201961" cy="0"/>
-          </a:xfrm>
-          <a:prstGeom prst="straightConnector1">
-            <a:avLst/>
-          </a:prstGeom>
-          <a:ln>
-            <a:tailEnd type="arrow"/>
-          </a:ln>
-        </p:spPr>
-        <p:style>
-          <a:lnRef idx="2">
-            <a:schemeClr val="accent1"/>
-          </a:lnRef>
-          <a:fillRef idx="0">
-            <a:schemeClr val="accent1"/>
-          </a:fillRef>
-          <a:effectRef idx="1">
-            <a:schemeClr val="accent1"/>
-          </a:effectRef>
-          <a:fontRef idx="minor">
-            <a:schemeClr val="tx1"/>
-          </a:fontRef>
-        </p:style>
-      </p:cxnSp>
-      <p:sp>
-        <p:nvSpPr>
-          <p:cNvPr id="9" name="Rectangle 8"/>
-          <p:cNvSpPr/>
-          <p:nvPr/>
-        </p:nvSpPr>
-        <p:spPr>
-          <a:xfrm>
-            <a:off x="2485483" y="489415"/>
-            <a:ext cx="885902" cy="421268"/>
-          </a:xfrm>
-          <a:prstGeom prst="rect">
-            <a:avLst/>
-          </a:prstGeom>
-        </p:spPr>
-        <p:style>
-          <a:lnRef idx="0">
-            <a:schemeClr val="accent5"/>
-          </a:lnRef>
-          <a:fillRef idx="3">
-            <a:schemeClr val="accent5"/>
-          </a:fillRef>
-          <a:effectRef idx="3">
-            <a:schemeClr val="accent5"/>
-          </a:effectRef>
-          <a:fontRef idx="minor">
-            <a:schemeClr val="lt1"/>
-          </a:fontRef>
-        </p:style>
-        <p:txBody>
-          <a:bodyPr wrap="none" lIns="0" tIns="0" rIns="0" bIns="0" rtlCol="0" anchor="ctr"/>
-          <a:lstStyle/>
-          <a:p>
-            <a:pPr algn="ctr"/>
-            <a:r>
-              <a:rPr lang="en-US" sz="1050" dirty="0" smtClean="0"/>
-              <a:t>2.2 Four Corners</a:t>
-            </a:r>
-          </a:p>
-          <a:p>
-            <a:pPr algn="ctr"/>
-            <a:r>
-              <a:rPr lang="en-US" sz="1050" dirty="0" smtClean="0"/>
-              <a:t>9/2011</a:t>
-            </a:r>
-            <a:endParaRPr lang="en-US" sz="1050" dirty="0"/>
-          </a:p>
-        </p:txBody>
-      </p:sp>
-      <p:cxnSp>
-        <p:nvCxnSpPr>
-          <p:cNvPr id="11" name="Straight Arrow Connector 10"/>
-          <p:cNvCxnSpPr>
-            <a:stCxn id="5" idx="3"/>
-            <a:endCxn id="9" idx="1"/>
-          </p:cNvCxnSpPr>
-          <p:nvPr/>
-        </p:nvCxnSpPr>
-        <p:spPr>
-          <a:xfrm>
-            <a:off x="2289717" y="700049"/>
-            <a:ext cx="195766" cy="0"/>
-          </a:xfrm>
-          <a:prstGeom prst="straightConnector1">
-            <a:avLst/>
-          </a:prstGeom>
-          <a:ln>
-            <a:tailEnd type="arrow"/>
-          </a:ln>
-        </p:spPr>
-        <p:style>
-          <a:lnRef idx="2">
-            <a:schemeClr val="accent1"/>
-          </a:lnRef>
-          <a:fillRef idx="0">
-            <a:schemeClr val="accent1"/>
-          </a:fillRef>
-          <a:effectRef idx="1">
-            <a:schemeClr val="accent1"/>
-          </a:effectRef>
-          <a:fontRef idx="minor">
-            <a:schemeClr val="tx1"/>
-          </a:fontRef>
-        </p:style>
-      </p:cxnSp>
-      <p:sp>
-        <p:nvSpPr>
           <p:cNvPr id="12" name="Rectangle 11"/>
           <p:cNvSpPr/>
           <p:nvPr/>
         </p:nvSpPr>
         <p:spPr>
           <a:xfrm>
-            <a:off x="3573347" y="489415"/>
+            <a:off x="587386" y="489415"/>
             <a:ext cx="885902" cy="421268"/>
           </a:xfrm>
           <a:prstGeom prst="rect">
@@ -3375,42 +3156,6 @@
           </a:p>
         </p:txBody>
       </p:sp>
-      <p:cxnSp>
-        <p:nvCxnSpPr>
-          <p:cNvPr id="14" name="Straight Arrow Connector 13"/>
-          <p:cNvCxnSpPr>
-            <a:stCxn id="9" idx="3"/>
-            <a:endCxn id="12" idx="1"/>
-          </p:cNvCxnSpPr>
-          <p:nvPr/>
-        </p:nvCxnSpPr>
-        <p:spPr>
-          <a:xfrm>
-            <a:off x="3371385" y="700049"/>
-            <a:ext cx="201962" cy="0"/>
-          </a:xfrm>
-          <a:prstGeom prst="straightConnector1">
-            <a:avLst/>
-          </a:prstGeom>
-          <a:ln>
-            <a:tailEnd type="arrow"/>
-          </a:ln>
-        </p:spPr>
-        <p:style>
-          <a:lnRef idx="2">
-            <a:schemeClr val="accent1"/>
-          </a:lnRef>
-          <a:fillRef idx="0">
-            <a:schemeClr val="accent1"/>
-          </a:fillRef>
-          <a:effectRef idx="1">
-            <a:schemeClr val="accent1"/>
-          </a:effectRef>
-          <a:fontRef idx="minor">
-            <a:schemeClr val="tx1"/>
-          </a:fontRef>
-        </p:style>
-      </p:cxnSp>
       <p:sp>
         <p:nvSpPr>
           <p:cNvPr id="15" name="Rectangle 14"/>
@@ -3419,7 +3164,7 @@
         </p:nvSpPr>
         <p:spPr>
           <a:xfrm>
-            <a:off x="3573347" y="1162205"/>
+            <a:off x="587386" y="1162205"/>
             <a:ext cx="885902" cy="421268"/>
           </a:xfrm>
           <a:prstGeom prst="rect">
@@ -3487,42 +3232,6 @@
       </p:sp>
       <p:cxnSp>
         <p:nvCxnSpPr>
-          <p:cNvPr id="17" name="Elbow Connector 16"/>
-          <p:cNvCxnSpPr>
-            <a:stCxn id="9" idx="2"/>
-            <a:endCxn id="15" idx="1"/>
-          </p:cNvCxnSpPr>
-          <p:nvPr/>
-        </p:nvCxnSpPr>
-        <p:spPr>
-          <a:xfrm rot="16200000" flipH="1">
-            <a:off x="3019812" y="819304"/>
-            <a:ext cx="462156" cy="644913"/>
-          </a:xfrm>
-          <a:prstGeom prst="bentConnector2">
-            <a:avLst/>
-          </a:prstGeom>
-          <a:ln>
-            <a:tailEnd type="arrow"/>
-          </a:ln>
-        </p:spPr>
-        <p:style>
-          <a:lnRef idx="2">
-            <a:schemeClr val="accent1"/>
-          </a:lnRef>
-          <a:fillRef idx="0">
-            <a:schemeClr val="accent1"/>
-          </a:fillRef>
-          <a:effectRef idx="1">
-            <a:schemeClr val="accent1"/>
-          </a:effectRef>
-          <a:fontRef idx="minor">
-            <a:schemeClr val="tx1"/>
-          </a:fontRef>
-        </p:style>
-      </p:cxnSp>
-      <p:cxnSp>
-        <p:nvCxnSpPr>
           <p:cNvPr id="19" name="Straight Arrow Connector 18"/>
           <p:cNvCxnSpPr>
             <a:stCxn id="12" idx="2"/>
@@ -3532,7 +3241,7 @@
         </p:nvCxnSpPr>
         <p:spPr>
           <a:xfrm>
-            <a:off x="4016298" y="910683"/>
+            <a:off x="1030337" y="910683"/>
             <a:ext cx="0" cy="251522"/>
           </a:xfrm>
           <a:prstGeom prst="straightConnector1">
@@ -3565,7 +3274,7 @@
         </p:nvSpPr>
         <p:spPr>
           <a:xfrm>
-            <a:off x="4685991" y="1162205"/>
+            <a:off x="1700030" y="1162205"/>
             <a:ext cx="885902" cy="421268"/>
           </a:xfrm>
           <a:prstGeom prst="rect">
@@ -3604,8 +3313,12 @@
           <a:p>
             <a:pPr algn="ctr"/>
             <a:r>
+              <a:rPr lang="en-US" sz="1050" dirty="0"/>
+              <a:t>9</a:t>
+            </a:r>
+            <a:r>
               <a:rPr lang="en-US" sz="1050" dirty="0" smtClean="0"/>
-              <a:t>10/2013</a:t>
+              <a:t>/2014</a:t>
             </a:r>
             <a:endParaRPr lang="en-US" sz="1050" dirty="0"/>
           </a:p>
@@ -3619,7 +3332,7 @@
         </p:nvSpPr>
         <p:spPr>
           <a:xfrm>
-            <a:off x="4685991" y="1828800"/>
+            <a:off x="2823393" y="1159157"/>
             <a:ext cx="885902" cy="421268"/>
           </a:xfrm>
           <a:prstGeom prst="rect">
@@ -3647,14 +3360,18 @@
             <a:pPr algn="ctr"/>
             <a:r>
               <a:rPr lang="en-US" sz="1050" dirty="0" smtClean="0"/>
-              <a:t>4.0 Jojoba</a:t>
+              <a:t>3.2 </a:t>
+            </a:r>
+            <a:r>
+              <a:rPr lang="en-US" sz="1050" dirty="0" smtClean="0"/>
+              <a:t>Jojoba</a:t>
             </a:r>
           </a:p>
           <a:p>
             <a:pPr algn="ctr"/>
             <a:r>
               <a:rPr lang="en-US" sz="1050" dirty="0" smtClean="0"/>
-              <a:t>10/2013</a:t>
+              <a:t>12/2014</a:t>
             </a:r>
             <a:endParaRPr lang="en-US" sz="1050" dirty="0"/>
           </a:p>
@@ -3671,7 +3388,7 @@
         </p:nvCxnSpPr>
         <p:spPr>
           <a:xfrm>
-            <a:off x="4459249" y="1372839"/>
+            <a:off x="1473288" y="1372839"/>
             <a:ext cx="226742" cy="0"/>
           </a:xfrm>
           <a:prstGeom prst="straightConnector1">
@@ -3698,19 +3415,105 @@
       </p:cxnSp>
       <p:cxnSp>
         <p:nvCxnSpPr>
-          <p:cNvPr id="27" name="Elbow Connector 26"/>
+          <p:cNvPr id="21" name="Straight Arrow Connector 20"/>
           <p:cNvCxnSpPr>
-            <a:stCxn id="15" idx="2"/>
+            <a:stCxn id="22" idx="3"/>
             <a:endCxn id="23" idx="1"/>
           </p:cNvCxnSpPr>
           <p:nvPr/>
         </p:nvCxnSpPr>
         <p:spPr>
-          <a:xfrm rot="16200000" flipH="1">
-            <a:off x="4123164" y="1476606"/>
-            <a:ext cx="455961" cy="669693"/>
+          <a:xfrm flipV="1">
+            <a:off x="2585932" y="1369791"/>
+            <a:ext cx="237461" cy="3048"/>
           </a:xfrm>
-          <a:prstGeom prst="bentConnector2">
+          <a:prstGeom prst="straightConnector1">
+            <a:avLst/>
+          </a:prstGeom>
+          <a:ln>
+            <a:tailEnd type="arrow"/>
+          </a:ln>
+        </p:spPr>
+        <p:style>
+          <a:lnRef idx="2">
+            <a:schemeClr val="accent1"/>
+          </a:lnRef>
+          <a:fillRef idx="0">
+            <a:schemeClr val="accent1"/>
+          </a:fillRef>
+          <a:effectRef idx="1">
+            <a:schemeClr val="accent1"/>
+          </a:effectRef>
+          <a:fontRef idx="minor">
+            <a:schemeClr val="tx1"/>
+          </a:fontRef>
+        </p:style>
+      </p:cxnSp>
+      <p:sp>
+        <p:nvSpPr>
+          <p:cNvPr id="28" name="Rectangle 27"/>
+          <p:cNvSpPr/>
+          <p:nvPr/>
+        </p:nvSpPr>
+        <p:spPr>
+          <a:xfrm>
+            <a:off x="3913390" y="1162205"/>
+            <a:ext cx="885902" cy="421268"/>
+          </a:xfrm>
+          <a:prstGeom prst="rect">
+            <a:avLst/>
+          </a:prstGeom>
+        </p:spPr>
+        <p:style>
+          <a:lnRef idx="0">
+            <a:schemeClr val="accent2"/>
+          </a:lnRef>
+          <a:fillRef idx="3">
+            <a:schemeClr val="accent2"/>
+          </a:fillRef>
+          <a:effectRef idx="3">
+            <a:schemeClr val="accent2"/>
+          </a:effectRef>
+          <a:fontRef idx="minor">
+            <a:schemeClr val="lt1"/>
+          </a:fontRef>
+        </p:style>
+        <p:txBody>
+          <a:bodyPr wrap="none" lIns="0" tIns="0" rIns="0" bIns="0" rtlCol="0" anchor="ctr"/>
+          <a:lstStyle/>
+          <a:p>
+            <a:pPr algn="ctr"/>
+            <a:r>
+              <a:rPr lang="en-US" sz="1050" dirty="0" smtClean="0"/>
+              <a:t>4.0 Keeler</a:t>
+            </a:r>
+            <a:endParaRPr lang="en-US" sz="1050" dirty="0" smtClean="0"/>
+          </a:p>
+          <a:p>
+            <a:pPr algn="ctr"/>
+            <a:r>
+              <a:rPr lang="en-US" sz="1050" dirty="0" smtClean="0"/>
+              <a:t>Late 2015</a:t>
+            </a:r>
+            <a:endParaRPr lang="en-US" sz="1050" dirty="0"/>
+          </a:p>
+        </p:txBody>
+      </p:sp>
+      <p:cxnSp>
+        <p:nvCxnSpPr>
+          <p:cNvPr id="30" name="Straight Arrow Connector 29"/>
+          <p:cNvCxnSpPr>
+            <a:stCxn id="23" idx="3"/>
+            <a:endCxn id="28" idx="1"/>
+          </p:cNvCxnSpPr>
+          <p:nvPr/>
+        </p:nvCxnSpPr>
+        <p:spPr>
+          <a:xfrm>
+            <a:off x="3709295" y="1369791"/>
+            <a:ext cx="204095" cy="3048"/>
+          </a:xfrm>
+          <a:prstGeom prst="straightConnector1">
             <a:avLst/>
           </a:prstGeom>
           <a:ln>
@@ -3745,7 +3548,7 @@
   <p:timing>
     <p:tnLst>
       <p:par>
-        <p:cTn xmlns:p14="http://schemas.microsoft.com/office/powerpoint/2010/main" id="1" dur="indefinite" restart="never" nodeType="tmRoot"/>
+        <p:cTn id="1" dur="indefinite" restart="never" nodeType="tmRoot"/>
       </p:par>
     </p:tnLst>
   </p:timing>

</xml_diff>

<commit_message>
(design) updated history graphic
</commit_message>
<xml_diff>
--- a/GridLAB-D_Family_Tree.pptx
+++ b/GridLAB-D_Family_Tree.pptx
@@ -288,7 +288,7 @@
           <a:p>
             <a:fld id="{D0F0FE34-5DA5-4D4A-9B61-DF714B9459B6}" type="datetimeFigureOut">
               <a:rPr lang="en-US" smtClean="0"/>
-              <a:t>8/12/2014</a:t>
+              <a:t>8/13/14</a:t>
             </a:fld>
             <a:endParaRPr lang="en-US"/>
           </a:p>
@@ -458,7 +458,7 @@
           <a:p>
             <a:fld id="{D0F0FE34-5DA5-4D4A-9B61-DF714B9459B6}" type="datetimeFigureOut">
               <a:rPr lang="en-US" smtClean="0"/>
-              <a:t>8/12/2014</a:t>
+              <a:t>8/13/14</a:t>
             </a:fld>
             <a:endParaRPr lang="en-US"/>
           </a:p>
@@ -638,7 +638,7 @@
           <a:p>
             <a:fld id="{D0F0FE34-5DA5-4D4A-9B61-DF714B9459B6}" type="datetimeFigureOut">
               <a:rPr lang="en-US" smtClean="0"/>
-              <a:t>8/12/2014</a:t>
+              <a:t>8/13/14</a:t>
             </a:fld>
             <a:endParaRPr lang="en-US"/>
           </a:p>
@@ -808,7 +808,7 @@
           <a:p>
             <a:fld id="{D0F0FE34-5DA5-4D4A-9B61-DF714B9459B6}" type="datetimeFigureOut">
               <a:rPr lang="en-US" smtClean="0"/>
-              <a:t>8/12/2014</a:t>
+              <a:t>8/13/14</a:t>
             </a:fld>
             <a:endParaRPr lang="en-US"/>
           </a:p>
@@ -1054,7 +1054,7 @@
           <a:p>
             <a:fld id="{D0F0FE34-5DA5-4D4A-9B61-DF714B9459B6}" type="datetimeFigureOut">
               <a:rPr lang="en-US" smtClean="0"/>
-              <a:t>8/12/2014</a:t>
+              <a:t>8/13/14</a:t>
             </a:fld>
             <a:endParaRPr lang="en-US"/>
           </a:p>
@@ -1342,7 +1342,7 @@
           <a:p>
             <a:fld id="{D0F0FE34-5DA5-4D4A-9B61-DF714B9459B6}" type="datetimeFigureOut">
               <a:rPr lang="en-US" smtClean="0"/>
-              <a:t>8/12/2014</a:t>
+              <a:t>8/13/14</a:t>
             </a:fld>
             <a:endParaRPr lang="en-US"/>
           </a:p>
@@ -1764,7 +1764,7 @@
           <a:p>
             <a:fld id="{D0F0FE34-5DA5-4D4A-9B61-DF714B9459B6}" type="datetimeFigureOut">
               <a:rPr lang="en-US" smtClean="0"/>
-              <a:t>8/12/2014</a:t>
+              <a:t>8/13/14</a:t>
             </a:fld>
             <a:endParaRPr lang="en-US"/>
           </a:p>
@@ -1882,7 +1882,7 @@
           <a:p>
             <a:fld id="{D0F0FE34-5DA5-4D4A-9B61-DF714B9459B6}" type="datetimeFigureOut">
               <a:rPr lang="en-US" smtClean="0"/>
-              <a:t>8/12/2014</a:t>
+              <a:t>8/13/14</a:t>
             </a:fld>
             <a:endParaRPr lang="en-US"/>
           </a:p>
@@ -1977,7 +1977,7 @@
           <a:p>
             <a:fld id="{D0F0FE34-5DA5-4D4A-9B61-DF714B9459B6}" type="datetimeFigureOut">
               <a:rPr lang="en-US" smtClean="0"/>
-              <a:t>8/12/2014</a:t>
+              <a:t>8/13/14</a:t>
             </a:fld>
             <a:endParaRPr lang="en-US"/>
           </a:p>
@@ -2254,7 +2254,7 @@
           <a:p>
             <a:fld id="{D0F0FE34-5DA5-4D4A-9B61-DF714B9459B6}" type="datetimeFigureOut">
               <a:rPr lang="en-US" smtClean="0"/>
-              <a:t>8/12/2014</a:t>
+              <a:t>8/13/14</a:t>
             </a:fld>
             <a:endParaRPr lang="en-US"/>
           </a:p>
@@ -2507,7 +2507,7 @@
           <a:p>
             <a:fld id="{D0F0FE34-5DA5-4D4A-9B61-DF714B9459B6}" type="datetimeFigureOut">
               <a:rPr lang="en-US" smtClean="0"/>
-              <a:t>8/12/2014</a:t>
+              <a:t>8/13/14</a:t>
             </a:fld>
             <a:endParaRPr lang="en-US"/>
           </a:p>
@@ -2720,7 +2720,7 @@
           <a:p>
             <a:fld id="{D0F0FE34-5DA5-4D4A-9B61-DF714B9459B6}" type="datetimeFigureOut">
               <a:rPr lang="en-US" smtClean="0"/>
-              <a:t>8/12/2014</a:t>
+              <a:t>8/13/14</a:t>
             </a:fld>
             <a:endParaRPr lang="en-US"/>
           </a:p>
@@ -3360,11 +3360,7 @@
             <a:pPr algn="ctr"/>
             <a:r>
               <a:rPr lang="en-US" sz="1050" dirty="0" smtClean="0"/>
-              <a:t>3.2 </a:t>
-            </a:r>
-            <a:r>
-              <a:rPr lang="en-US" sz="1050" dirty="0" smtClean="0"/>
-              <a:t>Jojoba</a:t>
+              <a:t>3.2 Jojoba</a:t>
             </a:r>
           </a:p>
           <a:p>
@@ -3457,7 +3453,7 @@
         </p:nvSpPr>
         <p:spPr>
           <a:xfrm>
-            <a:off x="3913390" y="1162205"/>
+            <a:off x="3913390" y="1818886"/>
             <a:ext cx="885902" cy="421268"/>
           </a:xfrm>
           <a:prstGeom prst="rect">
@@ -3487,7 +3483,6 @@
               <a:rPr lang="en-US" sz="1050" dirty="0" smtClean="0"/>
               <a:t>4.0 Keeler</a:t>
             </a:r>
-            <a:endParaRPr lang="en-US" sz="1050" dirty="0" smtClean="0"/>
           </a:p>
           <a:p>
             <a:pPr algn="ctr"/>
@@ -3503,15 +3498,117 @@
         <p:nvCxnSpPr>
           <p:cNvPr id="30" name="Straight Arrow Connector 29"/>
           <p:cNvCxnSpPr>
-            <a:stCxn id="23" idx="3"/>
+            <a:stCxn id="15" idx="2"/>
+            <a:endCxn id="11" idx="0"/>
+          </p:cNvCxnSpPr>
+          <p:nvPr/>
+        </p:nvCxnSpPr>
+        <p:spPr>
+          <a:xfrm>
+            <a:off x="1030337" y="1583473"/>
+            <a:ext cx="0" cy="232365"/>
+          </a:xfrm>
+          <a:prstGeom prst="straightConnector1">
+            <a:avLst/>
+          </a:prstGeom>
+          <a:ln>
+            <a:tailEnd type="arrow"/>
+          </a:ln>
+        </p:spPr>
+        <p:style>
+          <a:lnRef idx="2">
+            <a:schemeClr val="accent1"/>
+          </a:lnRef>
+          <a:fillRef idx="0">
+            <a:schemeClr val="accent1"/>
+          </a:fillRef>
+          <a:effectRef idx="1">
+            <a:schemeClr val="accent1"/>
+          </a:effectRef>
+          <a:fontRef idx="minor">
+            <a:schemeClr val="tx1"/>
+          </a:fontRef>
+        </p:style>
+      </p:cxnSp>
+      <p:sp>
+        <p:nvSpPr>
+          <p:cNvPr id="11" name="Rectangle 10"/>
+          <p:cNvSpPr/>
+          <p:nvPr/>
+        </p:nvSpPr>
+        <p:spPr>
+          <a:xfrm>
+            <a:off x="587386" y="1815838"/>
+            <a:ext cx="885902" cy="421268"/>
+          </a:xfrm>
+          <a:prstGeom prst="rect">
+            <a:avLst/>
+          </a:prstGeom>
+        </p:spPr>
+        <p:style>
+          <a:lnRef idx="0">
+            <a:schemeClr val="dk1"/>
+          </a:lnRef>
+          <a:fillRef idx="3">
+            <a:schemeClr val="dk1"/>
+          </a:fillRef>
+          <a:effectRef idx="3">
+            <a:schemeClr val="dk1"/>
+          </a:effectRef>
+          <a:fontRef idx="minor">
+            <a:schemeClr val="lt1"/>
+          </a:fontRef>
+        </p:style>
+        <p:txBody>
+          <a:bodyPr wrap="none" lIns="0" tIns="0" rIns="0" bIns="0" rtlCol="0" anchor="ctr"/>
+          <a:lstStyle/>
+          <a:p>
+            <a:pPr algn="ctr"/>
+            <a:r>
+              <a:rPr lang="en-US" sz="1050" dirty="0" smtClean="0">
+                <a:solidFill>
+                  <a:schemeClr val="bg1"/>
+                </a:solidFill>
+              </a:rPr>
+              <a:t>trunk</a:t>
+            </a:r>
+            <a:endParaRPr lang="en-US" sz="1050" dirty="0" smtClean="0">
+              <a:solidFill>
+                <a:schemeClr val="bg1"/>
+              </a:solidFill>
+            </a:endParaRPr>
+          </a:p>
+          <a:p>
+            <a:pPr algn="ctr"/>
+            <a:r>
+              <a:rPr lang="en-US" sz="1050" dirty="0" smtClean="0">
+                <a:solidFill>
+                  <a:schemeClr val="bg1"/>
+                </a:solidFill>
+              </a:rPr>
+              <a:t>(ongoing)</a:t>
+            </a:r>
+            <a:endParaRPr lang="en-US" sz="1050" dirty="0">
+              <a:solidFill>
+                <a:schemeClr val="bg1"/>
+              </a:solidFill>
+            </a:endParaRPr>
+          </a:p>
+        </p:txBody>
+      </p:sp>
+      <p:cxnSp>
+        <p:nvCxnSpPr>
+          <p:cNvPr id="16" name="Straight Arrow Connector 15"/>
+          <p:cNvCxnSpPr>
+            <a:stCxn id="11" idx="3"/>
             <a:endCxn id="28" idx="1"/>
           </p:cNvCxnSpPr>
           <p:nvPr/>
         </p:nvCxnSpPr>
         <p:spPr>
           <a:xfrm>
-            <a:off x="3709295" y="1369791"/>
-            <a:ext cx="204095" cy="3048"/>
+            <a:off x="1473288" y="2026472"/>
+            <a:ext cx="2440102" cy="3048"/>
           </a:xfrm>
           <a:prstGeom prst="straightConnector1">
             <a:avLst/>
@@ -3548,7 +3645,7 @@
   <p:timing>
     <p:tnLst>
       <p:par>
-        <p:cTn id="1" dur="indefinite" restart="never" nodeType="tmRoot"/>
+        <p:cTn xmlns:p14="http://schemas.microsoft.com/office/powerpoint/2010/main" id="1" dur="indefinite" restart="never" nodeType="tmRoot"/>
       </p:par>
     </p:tnLst>
   </p:timing>

</xml_diff>